<commit_message>
Update Figure 7 for pipe flow
</commit_message>
<xml_diff>
--- a/images/Analysis/multiphase-pipe-flow/figures.pptx
+++ b/images/Analysis/multiphase-pipe-flow/figures.pptx
@@ -3703,7 +3703,7 @@
           <a:p>
             <a:fld id="{CB20CB70-0AD5-4FB1-BEA8-D36B0E353B3C}" type="datetimeFigureOut">
               <a:rPr lang="en-AU" smtClean="0"/>
-              <a:t>25/02/2025</a:t>
+              <a:t>26/02/2025</a:t>
             </a:fld>
             <a:endParaRPr lang="en-AU"/>
           </a:p>
@@ -3903,7 +3903,7 @@
           <a:p>
             <a:fld id="{CB20CB70-0AD5-4FB1-BEA8-D36B0E353B3C}" type="datetimeFigureOut">
               <a:rPr lang="en-AU" smtClean="0"/>
-              <a:t>25/02/2025</a:t>
+              <a:t>26/02/2025</a:t>
             </a:fld>
             <a:endParaRPr lang="en-AU"/>
           </a:p>
@@ -4113,7 +4113,7 @@
           <a:p>
             <a:fld id="{CB20CB70-0AD5-4FB1-BEA8-D36B0E353B3C}" type="datetimeFigureOut">
               <a:rPr lang="en-AU" smtClean="0"/>
-              <a:t>25/02/2025</a:t>
+              <a:t>26/02/2025</a:t>
             </a:fld>
             <a:endParaRPr lang="en-AU"/>
           </a:p>
@@ -4313,7 +4313,7 @@
           <a:p>
             <a:fld id="{CB20CB70-0AD5-4FB1-BEA8-D36B0E353B3C}" type="datetimeFigureOut">
               <a:rPr lang="en-AU" smtClean="0"/>
-              <a:t>25/02/2025</a:t>
+              <a:t>26/02/2025</a:t>
             </a:fld>
             <a:endParaRPr lang="en-AU"/>
           </a:p>
@@ -4589,7 +4589,7 @@
           <a:p>
             <a:fld id="{CB20CB70-0AD5-4FB1-BEA8-D36B0E353B3C}" type="datetimeFigureOut">
               <a:rPr lang="en-AU" smtClean="0"/>
-              <a:t>25/02/2025</a:t>
+              <a:t>26/02/2025</a:t>
             </a:fld>
             <a:endParaRPr lang="en-AU"/>
           </a:p>
@@ -4857,7 +4857,7 @@
           <a:p>
             <a:fld id="{CB20CB70-0AD5-4FB1-BEA8-D36B0E353B3C}" type="datetimeFigureOut">
               <a:rPr lang="en-AU" smtClean="0"/>
-              <a:t>25/02/2025</a:t>
+              <a:t>26/02/2025</a:t>
             </a:fld>
             <a:endParaRPr lang="en-AU"/>
           </a:p>
@@ -5272,7 +5272,7 @@
           <a:p>
             <a:fld id="{CB20CB70-0AD5-4FB1-BEA8-D36B0E353B3C}" type="datetimeFigureOut">
               <a:rPr lang="en-AU" smtClean="0"/>
-              <a:t>25/02/2025</a:t>
+              <a:t>26/02/2025</a:t>
             </a:fld>
             <a:endParaRPr lang="en-AU"/>
           </a:p>
@@ -5414,7 +5414,7 @@
           <a:p>
             <a:fld id="{CB20CB70-0AD5-4FB1-BEA8-D36B0E353B3C}" type="datetimeFigureOut">
               <a:rPr lang="en-AU" smtClean="0"/>
-              <a:t>25/02/2025</a:t>
+              <a:t>26/02/2025</a:t>
             </a:fld>
             <a:endParaRPr lang="en-AU"/>
           </a:p>
@@ -5527,7 +5527,7 @@
           <a:p>
             <a:fld id="{CB20CB70-0AD5-4FB1-BEA8-D36B0E353B3C}" type="datetimeFigureOut">
               <a:rPr lang="en-AU" smtClean="0"/>
-              <a:t>25/02/2025</a:t>
+              <a:t>26/02/2025</a:t>
             </a:fld>
             <a:endParaRPr lang="en-AU"/>
           </a:p>
@@ -5840,7 +5840,7 @@
           <a:p>
             <a:fld id="{CB20CB70-0AD5-4FB1-BEA8-D36B0E353B3C}" type="datetimeFigureOut">
               <a:rPr lang="en-AU" smtClean="0"/>
-              <a:t>25/02/2025</a:t>
+              <a:t>26/02/2025</a:t>
             </a:fld>
             <a:endParaRPr lang="en-AU"/>
           </a:p>
@@ -6129,7 +6129,7 @@
           <a:p>
             <a:fld id="{CB20CB70-0AD5-4FB1-BEA8-D36B0E353B3C}" type="datetimeFigureOut">
               <a:rPr lang="en-AU" smtClean="0"/>
-              <a:t>25/02/2025</a:t>
+              <a:t>26/02/2025</a:t>
             </a:fld>
             <a:endParaRPr lang="en-AU"/>
           </a:p>
@@ -6372,7 +6372,7 @@
           <a:p>
             <a:fld id="{CB20CB70-0AD5-4FB1-BEA8-D36B0E353B3C}" type="datetimeFigureOut">
               <a:rPr lang="en-AU" smtClean="0"/>
-              <a:t>25/02/2025</a:t>
+              <a:t>26/02/2025</a:t>
             </a:fld>
             <a:endParaRPr lang="en-AU"/>
           </a:p>
@@ -45341,18 +45341,18 @@
           <p:cNvCxnSpPr>
             <a:cxnSpLocks/>
             <a:stCxn id="32" idx="6"/>
-            <a:endCxn id="172" idx="1"/>
+            <a:endCxn id="282" idx="1"/>
           </p:cNvCxnSpPr>
           <p:nvPr/>
         </p:nvCxnSpPr>
         <p:spPr>
           <a:xfrm flipV="1">
-            <a:off x="8362571" y="3122024"/>
-            <a:ext cx="1185123" cy="2844737"/>
+            <a:off x="8362571" y="3085164"/>
+            <a:ext cx="1333104" cy="2881597"/>
           </a:xfrm>
           <a:prstGeom prst="bentConnector3">
             <a:avLst>
-              <a:gd name="adj1" fmla="val 88064"/>
+              <a:gd name="adj1" fmla="val 77541"/>
             </a:avLst>
           </a:prstGeom>
           <a:ln w="28575">
@@ -45747,7 +45747,15 @@
             <a:pPr algn="ctr"/>
             <a:r>
               <a:rPr lang="en-AU" sz="1100" dirty="0"/>
-              <a:t>Equation of State Fluid Properties</a:t>
+              <a:t>EPPR78 Cubic </a:t>
+            </a:r>
+            <a:r>
+              <a:rPr lang="en-AU" sz="1100" dirty="0" err="1"/>
+              <a:t>EoS</a:t>
+            </a:r>
+            <a:r>
+              <a:rPr lang="en-AU" sz="1100" dirty="0"/>
+              <a:t> Fluid Properties</a:t>
             </a:r>
             <a:br>
               <a:rPr lang="en-AU" sz="1100" dirty="0"/>
@@ -45814,50 +45822,6 @@
           </a:p>
         </p:txBody>
       </p:sp>
-      <p:cxnSp>
-        <p:nvCxnSpPr>
-          <p:cNvPr id="238" name="Straight Arrow Connector 237">
-            <a:extLst>
-              <a:ext uri="{FF2B5EF4-FFF2-40B4-BE49-F238E27FC236}">
-                <a16:creationId xmlns:a16="http://schemas.microsoft.com/office/drawing/2014/main" id="{5D058A83-D87D-9717-F17D-FDE319F62B05}"/>
-              </a:ext>
-            </a:extLst>
-          </p:cNvPr>
-          <p:cNvCxnSpPr>
-            <a:stCxn id="133" idx="3"/>
-          </p:cNvCxnSpPr>
-          <p:nvPr/>
-        </p:nvCxnSpPr>
-        <p:spPr>
-          <a:xfrm>
-            <a:off x="9174493" y="4121710"/>
-            <a:ext cx="373202" cy="0"/>
-          </a:xfrm>
-          <a:prstGeom prst="straightConnector1">
-            <a:avLst/>
-          </a:prstGeom>
-          <a:ln w="28575">
-            <a:solidFill>
-              <a:srgbClr val="CCCCFF"/>
-            </a:solidFill>
-            <a:tailEnd type="triangle"/>
-          </a:ln>
-        </p:spPr>
-        <p:style>
-          <a:lnRef idx="2">
-            <a:schemeClr val="accent1"/>
-          </a:lnRef>
-          <a:fillRef idx="0">
-            <a:schemeClr val="accent1"/>
-          </a:fillRef>
-          <a:effectRef idx="1">
-            <a:schemeClr val="accent1"/>
-          </a:effectRef>
-          <a:fontRef idx="minor">
-            <a:schemeClr val="tx1"/>
-          </a:fontRef>
-        </p:style>
-      </p:cxnSp>
       <p:cxnSp>
         <p:nvCxnSpPr>
           <p:cNvPr id="253" name="Connector: Elbow 252">
@@ -46830,7 +46794,7 @@
         </p:nvSpPr>
         <p:spPr>
           <a:xfrm>
-            <a:off x="3346694" y="278559"/>
+            <a:off x="3282818" y="278559"/>
             <a:ext cx="347514" cy="347514"/>
           </a:xfrm>
           <a:prstGeom prst="ellipse">
@@ -47726,6 +47690,103 @@
           </a:p>
         </p:txBody>
       </p:sp>
+      <p:cxnSp>
+        <p:nvCxnSpPr>
+          <p:cNvPr id="4" name="Straight Connector 3">
+            <a:extLst>
+              <a:ext uri="{FF2B5EF4-FFF2-40B4-BE49-F238E27FC236}">
+                <a16:creationId xmlns:a16="http://schemas.microsoft.com/office/drawing/2014/main" id="{2F6D16D0-9591-4731-BA9C-1D3D1933C7DF}"/>
+              </a:ext>
+            </a:extLst>
+          </p:cNvPr>
+          <p:cNvCxnSpPr>
+            <a:cxnSpLocks/>
+          </p:cNvCxnSpPr>
+          <p:nvPr/>
+        </p:nvCxnSpPr>
+        <p:spPr>
+          <a:xfrm>
+            <a:off x="8952072" y="2941320"/>
+            <a:ext cx="0" cy="990366"/>
+          </a:xfrm>
+          <a:prstGeom prst="line">
+            <a:avLst/>
+          </a:prstGeom>
+          <a:solidFill>
+            <a:schemeClr val="bg1"/>
+          </a:solidFill>
+          <a:ln w="28575">
+            <a:solidFill>
+              <a:srgbClr val="9999FF"/>
+            </a:solidFill>
+          </a:ln>
+        </p:spPr>
+        <p:style>
+          <a:lnRef idx="2">
+            <a:schemeClr val="accent1">
+              <a:shade val="15000"/>
+            </a:schemeClr>
+          </a:lnRef>
+          <a:fillRef idx="1">
+            <a:schemeClr val="accent1"/>
+          </a:fillRef>
+          <a:effectRef idx="0">
+            <a:schemeClr val="accent1"/>
+          </a:effectRef>
+          <a:fontRef idx="minor">
+            <a:schemeClr val="lt1"/>
+          </a:fontRef>
+        </p:style>
+      </p:cxnSp>
+      <p:cxnSp>
+        <p:nvCxnSpPr>
+          <p:cNvPr id="23" name="Straight Connector 22">
+            <a:extLst>
+              <a:ext uri="{FF2B5EF4-FFF2-40B4-BE49-F238E27FC236}">
+                <a16:creationId xmlns:a16="http://schemas.microsoft.com/office/drawing/2014/main" id="{50ABCB6A-49E7-13DA-CCCB-51B1FDF8C3FD}"/>
+              </a:ext>
+            </a:extLst>
+          </p:cNvPr>
+          <p:cNvCxnSpPr>
+            <a:cxnSpLocks/>
+          </p:cNvCxnSpPr>
+          <p:nvPr/>
+        </p:nvCxnSpPr>
+        <p:spPr>
+          <a:xfrm>
+            <a:off x="8943958" y="2953101"/>
+            <a:ext cx="751717" cy="0"/>
+          </a:xfrm>
+          <a:prstGeom prst="line">
+            <a:avLst/>
+          </a:prstGeom>
+          <a:solidFill>
+            <a:schemeClr val="bg1"/>
+          </a:solidFill>
+          <a:ln w="28575">
+            <a:solidFill>
+              <a:srgbClr val="9999FF"/>
+            </a:solidFill>
+            <a:tailEnd type="triangle"/>
+          </a:ln>
+        </p:spPr>
+        <p:style>
+          <a:lnRef idx="2">
+            <a:schemeClr val="accent1">
+              <a:shade val="15000"/>
+            </a:schemeClr>
+          </a:lnRef>
+          <a:fillRef idx="1">
+            <a:schemeClr val="accent1"/>
+          </a:fillRef>
+          <a:effectRef idx="0">
+            <a:schemeClr val="accent1"/>
+          </a:effectRef>
+          <a:fontRef idx="minor">
+            <a:schemeClr val="lt1"/>
+          </a:fontRef>
+        </p:style>
+      </p:cxnSp>
     </p:spTree>
     <p:extLst>
       <p:ext uri="{BB962C8B-B14F-4D97-AF65-F5344CB8AC3E}">

</xml_diff>

<commit_message>
Fixed incorrect representation of drawdown
Wellbore simulation blog post showed an increase in pressure at entry to the tubing, which is incorrect. Fixed this to show a simple change in pressure.
</commit_message>
<xml_diff>
--- a/images/Analysis/multiphase-pipe-flow/figures.pptx
+++ b/images/Analysis/multiphase-pipe-flow/figures.pptx
@@ -595,6 +595,7 @@
     </c:plotArea>
     <c:plotVisOnly val="1"/>
     <c:dispBlanksAs val="gap"/>
+    <c:showDLblsOverMax val="0"/>
     <c:extLst>
       <c:ext xmlns:c16r3="http://schemas.microsoft.com/office/drawing/2017/03/chart" uri="{56B9EC1D-385E-4148-901F-78D8002777C0}">
         <c16r3:dataDisplayOptions16>
@@ -602,7 +603,6 @@
         </c16r3:dataDisplayOptions16>
       </c:ext>
     </c:extLst>
-    <c:showDLblsOverMax val="0"/>
   </c:chart>
   <c:spPr>
     <a:noFill/>
@@ -2410,6 +2410,7 @@
     </c:legend>
     <c:plotVisOnly val="1"/>
     <c:dispBlanksAs val="gap"/>
+    <c:showDLblsOverMax val="0"/>
     <c:extLst>
       <c:ext xmlns:c16r3="http://schemas.microsoft.com/office/drawing/2017/03/chart" uri="{56B9EC1D-385E-4148-901F-78D8002777C0}">
         <c16r3:dataDisplayOptions16>
@@ -2417,7 +2418,6 @@
         </c16r3:dataDisplayOptions16>
       </c:ext>
     </c:extLst>
-    <c:showDLblsOverMax val="0"/>
   </c:chart>
   <c:spPr>
     <a:noFill/>
@@ -3703,7 +3703,7 @@
           <a:p>
             <a:fld id="{CB20CB70-0AD5-4FB1-BEA8-D36B0E353B3C}" type="datetimeFigureOut">
               <a:rPr lang="en-AU" smtClean="0"/>
-              <a:t>26/02/2025</a:t>
+              <a:t>2/09/2025</a:t>
             </a:fld>
             <a:endParaRPr lang="en-AU"/>
           </a:p>
@@ -3903,7 +3903,7 @@
           <a:p>
             <a:fld id="{CB20CB70-0AD5-4FB1-BEA8-D36B0E353B3C}" type="datetimeFigureOut">
               <a:rPr lang="en-AU" smtClean="0"/>
-              <a:t>26/02/2025</a:t>
+              <a:t>2/09/2025</a:t>
             </a:fld>
             <a:endParaRPr lang="en-AU"/>
           </a:p>
@@ -4113,7 +4113,7 @@
           <a:p>
             <a:fld id="{CB20CB70-0AD5-4FB1-BEA8-D36B0E353B3C}" type="datetimeFigureOut">
               <a:rPr lang="en-AU" smtClean="0"/>
-              <a:t>26/02/2025</a:t>
+              <a:t>2/09/2025</a:t>
             </a:fld>
             <a:endParaRPr lang="en-AU"/>
           </a:p>
@@ -4313,7 +4313,7 @@
           <a:p>
             <a:fld id="{CB20CB70-0AD5-4FB1-BEA8-D36B0E353B3C}" type="datetimeFigureOut">
               <a:rPr lang="en-AU" smtClean="0"/>
-              <a:t>26/02/2025</a:t>
+              <a:t>2/09/2025</a:t>
             </a:fld>
             <a:endParaRPr lang="en-AU"/>
           </a:p>
@@ -4589,7 +4589,7 @@
           <a:p>
             <a:fld id="{CB20CB70-0AD5-4FB1-BEA8-D36B0E353B3C}" type="datetimeFigureOut">
               <a:rPr lang="en-AU" smtClean="0"/>
-              <a:t>26/02/2025</a:t>
+              <a:t>2/09/2025</a:t>
             </a:fld>
             <a:endParaRPr lang="en-AU"/>
           </a:p>
@@ -4857,7 +4857,7 @@
           <a:p>
             <a:fld id="{CB20CB70-0AD5-4FB1-BEA8-D36B0E353B3C}" type="datetimeFigureOut">
               <a:rPr lang="en-AU" smtClean="0"/>
-              <a:t>26/02/2025</a:t>
+              <a:t>2/09/2025</a:t>
             </a:fld>
             <a:endParaRPr lang="en-AU"/>
           </a:p>
@@ -5272,7 +5272,7 @@
           <a:p>
             <a:fld id="{CB20CB70-0AD5-4FB1-BEA8-D36B0E353B3C}" type="datetimeFigureOut">
               <a:rPr lang="en-AU" smtClean="0"/>
-              <a:t>26/02/2025</a:t>
+              <a:t>2/09/2025</a:t>
             </a:fld>
             <a:endParaRPr lang="en-AU"/>
           </a:p>
@@ -5414,7 +5414,7 @@
           <a:p>
             <a:fld id="{CB20CB70-0AD5-4FB1-BEA8-D36B0E353B3C}" type="datetimeFigureOut">
               <a:rPr lang="en-AU" smtClean="0"/>
-              <a:t>26/02/2025</a:t>
+              <a:t>2/09/2025</a:t>
             </a:fld>
             <a:endParaRPr lang="en-AU"/>
           </a:p>
@@ -5527,7 +5527,7 @@
           <a:p>
             <a:fld id="{CB20CB70-0AD5-4FB1-BEA8-D36B0E353B3C}" type="datetimeFigureOut">
               <a:rPr lang="en-AU" smtClean="0"/>
-              <a:t>26/02/2025</a:t>
+              <a:t>2/09/2025</a:t>
             </a:fld>
             <a:endParaRPr lang="en-AU"/>
           </a:p>
@@ -5840,7 +5840,7 @@
           <a:p>
             <a:fld id="{CB20CB70-0AD5-4FB1-BEA8-D36B0E353B3C}" type="datetimeFigureOut">
               <a:rPr lang="en-AU" smtClean="0"/>
-              <a:t>26/02/2025</a:t>
+              <a:t>2/09/2025</a:t>
             </a:fld>
             <a:endParaRPr lang="en-AU"/>
           </a:p>
@@ -6129,7 +6129,7 @@
           <a:p>
             <a:fld id="{CB20CB70-0AD5-4FB1-BEA8-D36B0E353B3C}" type="datetimeFigureOut">
               <a:rPr lang="en-AU" smtClean="0"/>
-              <a:t>26/02/2025</a:t>
+              <a:t>2/09/2025</a:t>
             </a:fld>
             <a:endParaRPr lang="en-AU"/>
           </a:p>
@@ -6372,7 +6372,7 @@
           <a:p>
             <a:fld id="{CB20CB70-0AD5-4FB1-BEA8-D36B0E353B3C}" type="datetimeFigureOut">
               <a:rPr lang="en-AU" smtClean="0"/>
-              <a:t>26/02/2025</a:t>
+              <a:t>2/09/2025</a:t>
             </a:fld>
             <a:endParaRPr lang="en-AU"/>
           </a:p>
@@ -10088,7 +10088,7 @@
         <p:spPr>
           <a:xfrm>
             <a:off x="7892484" y="518901"/>
-            <a:ext cx="767162" cy="5454449"/>
+            <a:ext cx="672469" cy="5865930"/>
           </a:xfrm>
           <a:custGeom>
             <a:avLst/>
@@ -10191,90 +10191,6 @@
           </a:p>
         </p:txBody>
       </p:sp>
-      <p:cxnSp>
-        <p:nvCxnSpPr>
-          <p:cNvPr id="216" name="Straight Connector 215">
-            <a:extLst>
-              <a:ext uri="{FF2B5EF4-FFF2-40B4-BE49-F238E27FC236}">
-                <a16:creationId xmlns:a16="http://schemas.microsoft.com/office/drawing/2014/main" id="{EBE14094-E2B4-FB64-B3A8-04DC24B7B792}"/>
-              </a:ext>
-            </a:extLst>
-          </p:cNvPr>
-          <p:cNvCxnSpPr/>
-          <p:nvPr/>
-        </p:nvCxnSpPr>
-        <p:spPr>
-          <a:xfrm>
-            <a:off x="8457833" y="5973350"/>
-            <a:ext cx="201834" cy="0"/>
-          </a:xfrm>
-          <a:prstGeom prst="line">
-            <a:avLst/>
-          </a:prstGeom>
-          <a:ln w="38100">
-            <a:solidFill>
-              <a:srgbClr val="0070C0"/>
-            </a:solidFill>
-          </a:ln>
-        </p:spPr>
-        <p:style>
-          <a:lnRef idx="2">
-            <a:schemeClr val="accent1"/>
-          </a:lnRef>
-          <a:fillRef idx="0">
-            <a:schemeClr val="accent1"/>
-          </a:fillRef>
-          <a:effectRef idx="1">
-            <a:schemeClr val="accent1"/>
-          </a:effectRef>
-          <a:fontRef idx="minor">
-            <a:schemeClr val="tx1"/>
-          </a:fontRef>
-        </p:style>
-      </p:cxnSp>
-      <p:cxnSp>
-        <p:nvCxnSpPr>
-          <p:cNvPr id="218" name="Straight Connector 217">
-            <a:extLst>
-              <a:ext uri="{FF2B5EF4-FFF2-40B4-BE49-F238E27FC236}">
-                <a16:creationId xmlns:a16="http://schemas.microsoft.com/office/drawing/2014/main" id="{265E08E5-368E-65FB-6D04-E80608F8B812}"/>
-              </a:ext>
-            </a:extLst>
-          </p:cNvPr>
-          <p:cNvCxnSpPr>
-            <a:cxnSpLocks/>
-          </p:cNvCxnSpPr>
-          <p:nvPr/>
-        </p:nvCxnSpPr>
-        <p:spPr>
-          <a:xfrm>
-            <a:off x="8457833" y="5973350"/>
-            <a:ext cx="103909" cy="417263"/>
-          </a:xfrm>
-          <a:prstGeom prst="line">
-            <a:avLst/>
-          </a:prstGeom>
-          <a:ln w="38100">
-            <a:solidFill>
-              <a:srgbClr val="0070C0"/>
-            </a:solidFill>
-          </a:ln>
-        </p:spPr>
-        <p:style>
-          <a:lnRef idx="2">
-            <a:schemeClr val="accent1"/>
-          </a:lnRef>
-          <a:fillRef idx="0">
-            <a:schemeClr val="accent1"/>
-          </a:fillRef>
-          <a:effectRef idx="1">
-            <a:schemeClr val="accent1"/>
-          </a:effectRef>
-          <a:fontRef idx="minor">
-            <a:schemeClr val="tx1"/>
-          </a:fontRef>
-        </p:style>
-      </p:cxnSp>
       <p:sp>
         <p:nvSpPr>
           <p:cNvPr id="220" name="Free-form: Shape 219">
@@ -10585,7 +10501,7 @@
         </p:nvCxnSpPr>
         <p:spPr>
           <a:xfrm flipV="1">
-            <a:off x="8581598" y="6051446"/>
+            <a:off x="8570929" y="6051446"/>
             <a:ext cx="0" cy="186794"/>
           </a:xfrm>
           <a:prstGeom prst="line">
@@ -10664,13 +10580,15 @@
               </a:ext>
             </a:extLst>
           </p:cNvPr>
-          <p:cNvCxnSpPr/>
+          <p:cNvCxnSpPr>
+            <a:cxnSpLocks/>
+          </p:cNvCxnSpPr>
           <p:nvPr/>
         </p:nvCxnSpPr>
         <p:spPr>
           <a:xfrm>
-            <a:off x="8581597" y="6127041"/>
-            <a:ext cx="580681" cy="0"/>
+            <a:off x="8564953" y="6136192"/>
+            <a:ext cx="597325" cy="0"/>
           </a:xfrm>
           <a:prstGeom prst="straightConnector1">
             <a:avLst/>

</xml_diff>